<commit_message>
Updated team logo with team number
</commit_message>
<xml_diff>
--- a/img/The-STEAMpunks-logo.pptx
+++ b/img/The-STEAMpunks-logo.pptx
@@ -289,7 +289,7 @@
           <a:p>
             <a:fld id="{2411E847-7360-4CC9-A2E7-7ADCCE3D3F4C}" type="datetimeFigureOut">
               <a:rPr lang="en-CA" smtClean="0"/>
-              <a:t>21/04/2014</a:t>
+              <a:t>07/05/2014</a:t>
             </a:fld>
             <a:endParaRPr lang="en-CA"/>
           </a:p>
@@ -459,7 +459,7 @@
           <a:p>
             <a:fld id="{2411E847-7360-4CC9-A2E7-7ADCCE3D3F4C}" type="datetimeFigureOut">
               <a:rPr lang="en-CA" smtClean="0"/>
-              <a:t>21/04/2014</a:t>
+              <a:t>07/05/2014</a:t>
             </a:fld>
             <a:endParaRPr lang="en-CA"/>
           </a:p>
@@ -639,7 +639,7 @@
           <a:p>
             <a:fld id="{2411E847-7360-4CC9-A2E7-7ADCCE3D3F4C}" type="datetimeFigureOut">
               <a:rPr lang="en-CA" smtClean="0"/>
-              <a:t>21/04/2014</a:t>
+              <a:t>07/05/2014</a:t>
             </a:fld>
             <a:endParaRPr lang="en-CA"/>
           </a:p>
@@ -809,7 +809,7 @@
           <a:p>
             <a:fld id="{2411E847-7360-4CC9-A2E7-7ADCCE3D3F4C}" type="datetimeFigureOut">
               <a:rPr lang="en-CA" smtClean="0"/>
-              <a:t>21/04/2014</a:t>
+              <a:t>07/05/2014</a:t>
             </a:fld>
             <a:endParaRPr lang="en-CA"/>
           </a:p>
@@ -1055,7 +1055,7 @@
           <a:p>
             <a:fld id="{2411E847-7360-4CC9-A2E7-7ADCCE3D3F4C}" type="datetimeFigureOut">
               <a:rPr lang="en-CA" smtClean="0"/>
-              <a:t>21/04/2014</a:t>
+              <a:t>07/05/2014</a:t>
             </a:fld>
             <a:endParaRPr lang="en-CA"/>
           </a:p>
@@ -1343,7 +1343,7 @@
           <a:p>
             <a:fld id="{2411E847-7360-4CC9-A2E7-7ADCCE3D3F4C}" type="datetimeFigureOut">
               <a:rPr lang="en-CA" smtClean="0"/>
-              <a:t>21/04/2014</a:t>
+              <a:t>07/05/2014</a:t>
             </a:fld>
             <a:endParaRPr lang="en-CA"/>
           </a:p>
@@ -1765,7 +1765,7 @@
           <a:p>
             <a:fld id="{2411E847-7360-4CC9-A2E7-7ADCCE3D3F4C}" type="datetimeFigureOut">
               <a:rPr lang="en-CA" smtClean="0"/>
-              <a:t>21/04/2014</a:t>
+              <a:t>07/05/2014</a:t>
             </a:fld>
             <a:endParaRPr lang="en-CA"/>
           </a:p>
@@ -1883,7 +1883,7 @@
           <a:p>
             <a:fld id="{2411E847-7360-4CC9-A2E7-7ADCCE3D3F4C}" type="datetimeFigureOut">
               <a:rPr lang="en-CA" smtClean="0"/>
-              <a:t>21/04/2014</a:t>
+              <a:t>07/05/2014</a:t>
             </a:fld>
             <a:endParaRPr lang="en-CA"/>
           </a:p>
@@ -1978,7 +1978,7 @@
           <a:p>
             <a:fld id="{2411E847-7360-4CC9-A2E7-7ADCCE3D3F4C}" type="datetimeFigureOut">
               <a:rPr lang="en-CA" smtClean="0"/>
-              <a:t>21/04/2014</a:t>
+              <a:t>07/05/2014</a:t>
             </a:fld>
             <a:endParaRPr lang="en-CA"/>
           </a:p>
@@ -2255,7 +2255,7 @@
           <a:p>
             <a:fld id="{2411E847-7360-4CC9-A2E7-7ADCCE3D3F4C}" type="datetimeFigureOut">
               <a:rPr lang="en-CA" smtClean="0"/>
-              <a:t>21/04/2014</a:t>
+              <a:t>07/05/2014</a:t>
             </a:fld>
             <a:endParaRPr lang="en-CA"/>
           </a:p>
@@ -2508,7 +2508,7 @@
           <a:p>
             <a:fld id="{2411E847-7360-4CC9-A2E7-7ADCCE3D3F4C}" type="datetimeFigureOut">
               <a:rPr lang="en-CA" smtClean="0"/>
-              <a:t>21/04/2014</a:t>
+              <a:t>07/05/2014</a:t>
             </a:fld>
             <a:endParaRPr lang="en-CA"/>
           </a:p>
@@ -2721,7 +2721,7 @@
           <a:p>
             <a:fld id="{2411E847-7360-4CC9-A2E7-7ADCCE3D3F4C}" type="datetimeFigureOut">
               <a:rPr lang="en-CA" smtClean="0"/>
-              <a:t>21/04/2014</a:t>
+              <a:t>07/05/2014</a:t>
             </a:fld>
             <a:endParaRPr lang="en-CA"/>
           </a:p>
@@ -3170,7 +3170,7 @@
         </p:nvSpPr>
         <p:spPr>
           <a:xfrm>
-            <a:off x="-88405" y="799324"/>
+            <a:off x="-88405" y="802492"/>
             <a:ext cx="9400037" cy="1470025"/>
           </a:xfrm>
           <a:prstGeom prst="rect">
@@ -3265,7 +3265,81 @@
               <a:rPr lang="en-CA" sz="3200" dirty="0" smtClean="0">
                 <a:latin typeface="Victorian LET" pitchFamily="2" charset="0"/>
               </a:rPr>
-              <a:t>Building Tomorrow’s Robots Since 2014</a:t>
+              <a:t>Building Tomorrow’s Robots </a:t>
+            </a:r>
+            <a:r>
+              <a:rPr lang="en-CA" sz="3200" dirty="0" smtClean="0">
+                <a:latin typeface="Victorian LET" pitchFamily="2" charset="0"/>
+              </a:rPr>
+              <a:t>Today</a:t>
+            </a:r>
+            <a:endParaRPr lang="en-CA" sz="3200" dirty="0">
+              <a:latin typeface="Victorian LET" pitchFamily="2" charset="0"/>
+            </a:endParaRPr>
+          </a:p>
+        </p:txBody>
+      </p:sp>
+      <p:sp>
+        <p:nvSpPr>
+          <p:cNvPr id="3" name="Rectangle 2"/>
+          <p:cNvSpPr/>
+          <p:nvPr/>
+        </p:nvSpPr>
+        <p:spPr>
+          <a:xfrm>
+            <a:off x="426273" y="1916832"/>
+            <a:ext cx="1553439" cy="584775"/>
+          </a:xfrm>
+          <a:prstGeom prst="rect">
+            <a:avLst/>
+          </a:prstGeom>
+        </p:spPr>
+        <p:txBody>
+          <a:bodyPr wrap="none">
+            <a:spAutoFit/>
+          </a:bodyPr>
+          <a:lstStyle/>
+          <a:p>
+            <a:pPr algn="ctr"/>
+            <a:r>
+              <a:rPr lang="en-CA" sz="3200" dirty="0" smtClean="0">
+                <a:latin typeface="Victorian LET" pitchFamily="2" charset="0"/>
+              </a:rPr>
+              <a:t>Team 476</a:t>
+            </a:r>
+            <a:endParaRPr lang="en-CA" sz="3200" dirty="0">
+              <a:latin typeface="Victorian LET" pitchFamily="2" charset="0"/>
+            </a:endParaRPr>
+          </a:p>
+        </p:txBody>
+      </p:sp>
+      <p:sp>
+        <p:nvSpPr>
+          <p:cNvPr id="6" name="Rectangle 5"/>
+          <p:cNvSpPr/>
+          <p:nvPr/>
+        </p:nvSpPr>
+        <p:spPr>
+          <a:xfrm>
+            <a:off x="7380527" y="1916832"/>
+            <a:ext cx="1511953" cy="584775"/>
+          </a:xfrm>
+          <a:prstGeom prst="rect">
+            <a:avLst/>
+          </a:prstGeom>
+        </p:spPr>
+        <p:txBody>
+          <a:bodyPr wrap="none">
+            <a:spAutoFit/>
+          </a:bodyPr>
+          <a:lstStyle/>
+          <a:p>
+            <a:pPr algn="ctr"/>
+            <a:r>
+              <a:rPr lang="en-CA" sz="3200" dirty="0" smtClean="0">
+                <a:latin typeface="Victorian LET" pitchFamily="2" charset="0"/>
+              </a:rPr>
+              <a:t>Est. 2014</a:t>
             </a:r>
             <a:endParaRPr lang="en-CA" sz="3200" dirty="0">
               <a:latin typeface="Victorian LET" pitchFamily="2" charset="0"/>

</xml_diff>